<commit_message>
Modify 8th homework error link.
</commit_message>
<xml_diff>
--- a/Homework-PythonSparkML_08/006-CreateHadoopContainerImage/Images/006-CreateHadoopContainerImage.pptx
+++ b/Homework-PythonSparkML_08/006-CreateHadoopContainerImage/Images/006-CreateHadoopContainerImage.pptx
@@ -14,12 +14,6 @@
     <p:sldId id="261" r:id="rId8"/>
     <p:sldId id="262" r:id="rId9"/>
     <p:sldId id="263" r:id="rId10"/>
-    <p:sldId id="264" r:id="rId11"/>
-    <p:sldId id="265" r:id="rId12"/>
-    <p:sldId id="266" r:id="rId13"/>
-    <p:sldId id="267" r:id="rId14"/>
-    <p:sldId id="268" r:id="rId15"/>
-    <p:sldId id="269" r:id="rId16"/>
   </p:sldIdLst>
   <p:sldSz cx="12192000" cy="6858000"/>
   <p:notesSz cx="6858000" cy="9144000"/>
@@ -118,7 +112,16 @@
       </a:defRPr>
     </a:lvl9pPr>
   </p:defaultTextStyle>
+  <p:extLst>
+    <p:ext uri="{EFAFB233-063F-42B5-8137-9DF3F51BA10A}">
+      <p15:sldGuideLst xmlns:p15="http://schemas.microsoft.com/office/powerpoint/2012/main"/>
+    </p:ext>
+  </p:extLst>
 </p:presentation>
+</file>
+
+<file path=ppt/revisionInfo.xml><?xml version="1.0" encoding="utf-8"?>
+<p1510:revInfo xmlns:a="http://schemas.openxmlformats.org/drawingml/2006/main" xmlns:r="http://schemas.openxmlformats.org/officeDocument/2006/relationships" xmlns:p1510="http://schemas.microsoft.com/office/powerpoint/2015/10/main"/>
 </file>
 
 <file path=ppt/slideLayouts/slideLayout1.xml><?xml version="1.0" encoding="utf-8"?>
@@ -163,10 +166,9 @@
           </a:lstStyle>
           <a:p>
             <a:r>
-              <a:rPr lang="zh-TW" altLang="en-US" smtClean="0"/>
+              <a:rPr lang="zh-TW" altLang="en-US"/>
               <a:t>按一下以編輯母片標題樣式</a:t>
             </a:r>
-            <a:endParaRPr lang="zh-TW" altLang="en-US"/>
           </a:p>
         </p:txBody>
       </p:sp>
@@ -228,10 +230,9 @@
           </a:lstStyle>
           <a:p>
             <a:r>
-              <a:rPr lang="zh-TW" altLang="en-US" smtClean="0"/>
+              <a:rPr lang="zh-TW" altLang="en-US"/>
               <a:t>按一下以編輯母片副標題樣式</a:t>
             </a:r>
-            <a:endParaRPr lang="zh-TW" altLang="en-US"/>
           </a:p>
         </p:txBody>
       </p:sp>
@@ -252,7 +253,7 @@
           <a:p>
             <a:fld id="{09ED4CA7-3F8E-487E-9B05-644D00AA2FC0}" type="datetimeFigureOut">
               <a:rPr lang="zh-TW" altLang="en-US" smtClean="0"/>
-              <a:t>2017/11/23</a:t>
+              <a:t>2017/11/27</a:t>
             </a:fld>
             <a:endParaRPr lang="zh-TW" altLang="en-US"/>
           </a:p>
@@ -346,10 +347,9 @@
           <a:lstStyle/>
           <a:p>
             <a:r>
-              <a:rPr lang="zh-TW" altLang="en-US" smtClean="0"/>
+              <a:rPr lang="zh-TW" altLang="en-US"/>
               <a:t>按一下以編輯母片標題樣式</a:t>
             </a:r>
-            <a:endParaRPr lang="zh-TW" altLang="en-US"/>
           </a:p>
         </p:txBody>
       </p:sp>
@@ -370,38 +370,37 @@
           <a:p>
             <a:pPr lvl="0"/>
             <a:r>
-              <a:rPr lang="zh-TW" altLang="en-US" smtClean="0"/>
+              <a:rPr lang="zh-TW" altLang="en-US"/>
               <a:t>按一下以編輯母片文字樣式</a:t>
             </a:r>
           </a:p>
           <a:p>
             <a:pPr lvl="1"/>
             <a:r>
-              <a:rPr lang="zh-TW" altLang="en-US" smtClean="0"/>
+              <a:rPr lang="zh-TW" altLang="en-US"/>
               <a:t>第二層</a:t>
             </a:r>
           </a:p>
           <a:p>
             <a:pPr lvl="2"/>
             <a:r>
-              <a:rPr lang="zh-TW" altLang="en-US" smtClean="0"/>
+              <a:rPr lang="zh-TW" altLang="en-US"/>
               <a:t>第三層</a:t>
             </a:r>
           </a:p>
           <a:p>
             <a:pPr lvl="3"/>
             <a:r>
-              <a:rPr lang="zh-TW" altLang="en-US" smtClean="0"/>
+              <a:rPr lang="zh-TW" altLang="en-US"/>
               <a:t>第四層</a:t>
             </a:r>
           </a:p>
           <a:p>
             <a:pPr lvl="4"/>
             <a:r>
-              <a:rPr lang="zh-TW" altLang="en-US" smtClean="0"/>
+              <a:rPr lang="zh-TW" altLang="en-US"/>
               <a:t>第五層</a:t>
             </a:r>
-            <a:endParaRPr lang="zh-TW" altLang="en-US"/>
           </a:p>
         </p:txBody>
       </p:sp>
@@ -422,7 +421,7 @@
           <a:p>
             <a:fld id="{09ED4CA7-3F8E-487E-9B05-644D00AA2FC0}" type="datetimeFigureOut">
               <a:rPr lang="zh-TW" altLang="en-US" smtClean="0"/>
-              <a:t>2017/11/23</a:t>
+              <a:t>2017/11/27</a:t>
             </a:fld>
             <a:endParaRPr lang="zh-TW" altLang="en-US"/>
           </a:p>
@@ -521,10 +520,9 @@
           <a:lstStyle/>
           <a:p>
             <a:r>
-              <a:rPr lang="zh-TW" altLang="en-US" smtClean="0"/>
+              <a:rPr lang="zh-TW" altLang="en-US"/>
               <a:t>按一下以編輯母片標題樣式</a:t>
             </a:r>
-            <a:endParaRPr lang="zh-TW" altLang="en-US"/>
           </a:p>
         </p:txBody>
       </p:sp>
@@ -550,38 +548,37 @@
           <a:p>
             <a:pPr lvl="0"/>
             <a:r>
-              <a:rPr lang="zh-TW" altLang="en-US" smtClean="0"/>
+              <a:rPr lang="zh-TW" altLang="en-US"/>
               <a:t>按一下以編輯母片文字樣式</a:t>
             </a:r>
           </a:p>
           <a:p>
             <a:pPr lvl="1"/>
             <a:r>
-              <a:rPr lang="zh-TW" altLang="en-US" smtClean="0"/>
+              <a:rPr lang="zh-TW" altLang="en-US"/>
               <a:t>第二層</a:t>
             </a:r>
           </a:p>
           <a:p>
             <a:pPr lvl="2"/>
             <a:r>
-              <a:rPr lang="zh-TW" altLang="en-US" smtClean="0"/>
+              <a:rPr lang="zh-TW" altLang="en-US"/>
               <a:t>第三層</a:t>
             </a:r>
           </a:p>
           <a:p>
             <a:pPr lvl="3"/>
             <a:r>
-              <a:rPr lang="zh-TW" altLang="en-US" smtClean="0"/>
+              <a:rPr lang="zh-TW" altLang="en-US"/>
               <a:t>第四層</a:t>
             </a:r>
           </a:p>
           <a:p>
             <a:pPr lvl="4"/>
             <a:r>
-              <a:rPr lang="zh-TW" altLang="en-US" smtClean="0"/>
+              <a:rPr lang="zh-TW" altLang="en-US"/>
               <a:t>第五層</a:t>
             </a:r>
-            <a:endParaRPr lang="zh-TW" altLang="en-US"/>
           </a:p>
         </p:txBody>
       </p:sp>
@@ -602,7 +599,7 @@
           <a:p>
             <a:fld id="{09ED4CA7-3F8E-487E-9B05-644D00AA2FC0}" type="datetimeFigureOut">
               <a:rPr lang="zh-TW" altLang="en-US" smtClean="0"/>
-              <a:t>2017/11/23</a:t>
+              <a:t>2017/11/27</a:t>
             </a:fld>
             <a:endParaRPr lang="zh-TW" altLang="en-US"/>
           </a:p>
@@ -696,10 +693,9 @@
           <a:lstStyle/>
           <a:p>
             <a:r>
-              <a:rPr lang="zh-TW" altLang="en-US" smtClean="0"/>
+              <a:rPr lang="zh-TW" altLang="en-US"/>
               <a:t>按一下以編輯母片標題樣式</a:t>
             </a:r>
-            <a:endParaRPr lang="zh-TW" altLang="en-US"/>
           </a:p>
         </p:txBody>
       </p:sp>
@@ -720,38 +716,37 @@
           <a:p>
             <a:pPr lvl="0"/>
             <a:r>
-              <a:rPr lang="zh-TW" altLang="en-US" smtClean="0"/>
+              <a:rPr lang="zh-TW" altLang="en-US"/>
               <a:t>按一下以編輯母片文字樣式</a:t>
             </a:r>
           </a:p>
           <a:p>
             <a:pPr lvl="1"/>
             <a:r>
-              <a:rPr lang="zh-TW" altLang="en-US" smtClean="0"/>
+              <a:rPr lang="zh-TW" altLang="en-US"/>
               <a:t>第二層</a:t>
             </a:r>
           </a:p>
           <a:p>
             <a:pPr lvl="2"/>
             <a:r>
-              <a:rPr lang="zh-TW" altLang="en-US" smtClean="0"/>
+              <a:rPr lang="zh-TW" altLang="en-US"/>
               <a:t>第三層</a:t>
             </a:r>
           </a:p>
           <a:p>
             <a:pPr lvl="3"/>
             <a:r>
-              <a:rPr lang="zh-TW" altLang="en-US" smtClean="0"/>
+              <a:rPr lang="zh-TW" altLang="en-US"/>
               <a:t>第四層</a:t>
             </a:r>
           </a:p>
           <a:p>
             <a:pPr lvl="4"/>
             <a:r>
-              <a:rPr lang="zh-TW" altLang="en-US" smtClean="0"/>
+              <a:rPr lang="zh-TW" altLang="en-US"/>
               <a:t>第五層</a:t>
             </a:r>
-            <a:endParaRPr lang="zh-TW" altLang="en-US"/>
           </a:p>
         </p:txBody>
       </p:sp>
@@ -772,7 +767,7 @@
           <a:p>
             <a:fld id="{09ED4CA7-3F8E-487E-9B05-644D00AA2FC0}" type="datetimeFigureOut">
               <a:rPr lang="zh-TW" altLang="en-US" smtClean="0"/>
-              <a:t>2017/11/23</a:t>
+              <a:t>2017/11/27</a:t>
             </a:fld>
             <a:endParaRPr lang="zh-TW" altLang="en-US"/>
           </a:p>
@@ -875,10 +870,9 @@
           </a:lstStyle>
           <a:p>
             <a:r>
-              <a:rPr lang="zh-TW" altLang="en-US" smtClean="0"/>
+              <a:rPr lang="zh-TW" altLang="en-US"/>
               <a:t>按一下以編輯母片標題樣式</a:t>
             </a:r>
-            <a:endParaRPr lang="zh-TW" altLang="en-US"/>
           </a:p>
         </p:txBody>
       </p:sp>
@@ -995,7 +989,7 @@
           <a:p>
             <a:pPr lvl="0"/>
             <a:r>
-              <a:rPr lang="zh-TW" altLang="en-US" smtClean="0"/>
+              <a:rPr lang="zh-TW" altLang="en-US"/>
               <a:t>按一下以編輯母片文字樣式</a:t>
             </a:r>
           </a:p>
@@ -1018,7 +1012,7 @@
           <a:p>
             <a:fld id="{09ED4CA7-3F8E-487E-9B05-644D00AA2FC0}" type="datetimeFigureOut">
               <a:rPr lang="zh-TW" altLang="en-US" smtClean="0"/>
-              <a:t>2017/11/23</a:t>
+              <a:t>2017/11/27</a:t>
             </a:fld>
             <a:endParaRPr lang="zh-TW" altLang="en-US"/>
           </a:p>
@@ -1112,10 +1106,9 @@
           <a:lstStyle/>
           <a:p>
             <a:r>
-              <a:rPr lang="zh-TW" altLang="en-US" smtClean="0"/>
+              <a:rPr lang="zh-TW" altLang="en-US"/>
               <a:t>按一下以編輯母片標題樣式</a:t>
             </a:r>
-            <a:endParaRPr lang="zh-TW" altLang="en-US"/>
           </a:p>
         </p:txBody>
       </p:sp>
@@ -1141,38 +1134,37 @@
           <a:p>
             <a:pPr lvl="0"/>
             <a:r>
-              <a:rPr lang="zh-TW" altLang="en-US" smtClean="0"/>
+              <a:rPr lang="zh-TW" altLang="en-US"/>
               <a:t>按一下以編輯母片文字樣式</a:t>
             </a:r>
           </a:p>
           <a:p>
             <a:pPr lvl="1"/>
             <a:r>
-              <a:rPr lang="zh-TW" altLang="en-US" smtClean="0"/>
+              <a:rPr lang="zh-TW" altLang="en-US"/>
               <a:t>第二層</a:t>
             </a:r>
           </a:p>
           <a:p>
             <a:pPr lvl="2"/>
             <a:r>
-              <a:rPr lang="zh-TW" altLang="en-US" smtClean="0"/>
+              <a:rPr lang="zh-TW" altLang="en-US"/>
               <a:t>第三層</a:t>
             </a:r>
           </a:p>
           <a:p>
             <a:pPr lvl="3"/>
             <a:r>
-              <a:rPr lang="zh-TW" altLang="en-US" smtClean="0"/>
+              <a:rPr lang="zh-TW" altLang="en-US"/>
               <a:t>第四層</a:t>
             </a:r>
           </a:p>
           <a:p>
             <a:pPr lvl="4"/>
             <a:r>
-              <a:rPr lang="zh-TW" altLang="en-US" smtClean="0"/>
+              <a:rPr lang="zh-TW" altLang="en-US"/>
               <a:t>第五層</a:t>
             </a:r>
-            <a:endParaRPr lang="zh-TW" altLang="en-US"/>
           </a:p>
         </p:txBody>
       </p:sp>
@@ -1198,38 +1190,37 @@
           <a:p>
             <a:pPr lvl="0"/>
             <a:r>
-              <a:rPr lang="zh-TW" altLang="en-US" smtClean="0"/>
+              <a:rPr lang="zh-TW" altLang="en-US"/>
               <a:t>按一下以編輯母片文字樣式</a:t>
             </a:r>
           </a:p>
           <a:p>
             <a:pPr lvl="1"/>
             <a:r>
-              <a:rPr lang="zh-TW" altLang="en-US" smtClean="0"/>
+              <a:rPr lang="zh-TW" altLang="en-US"/>
               <a:t>第二層</a:t>
             </a:r>
           </a:p>
           <a:p>
             <a:pPr lvl="2"/>
             <a:r>
-              <a:rPr lang="zh-TW" altLang="en-US" smtClean="0"/>
+              <a:rPr lang="zh-TW" altLang="en-US"/>
               <a:t>第三層</a:t>
             </a:r>
           </a:p>
           <a:p>
             <a:pPr lvl="3"/>
             <a:r>
-              <a:rPr lang="zh-TW" altLang="en-US" smtClean="0"/>
+              <a:rPr lang="zh-TW" altLang="en-US"/>
               <a:t>第四層</a:t>
             </a:r>
           </a:p>
           <a:p>
             <a:pPr lvl="4"/>
             <a:r>
-              <a:rPr lang="zh-TW" altLang="en-US" smtClean="0"/>
+              <a:rPr lang="zh-TW" altLang="en-US"/>
               <a:t>第五層</a:t>
             </a:r>
-            <a:endParaRPr lang="zh-TW" altLang="en-US"/>
           </a:p>
         </p:txBody>
       </p:sp>
@@ -1250,7 +1241,7 @@
           <a:p>
             <a:fld id="{09ED4CA7-3F8E-487E-9B05-644D00AA2FC0}" type="datetimeFigureOut">
               <a:rPr lang="zh-TW" altLang="en-US" smtClean="0"/>
-              <a:t>2017/11/23</a:t>
+              <a:t>2017/11/27</a:t>
             </a:fld>
             <a:endParaRPr lang="zh-TW" altLang="en-US"/>
           </a:p>
@@ -1349,10 +1340,9 @@
           <a:lstStyle/>
           <a:p>
             <a:r>
-              <a:rPr lang="zh-TW" altLang="en-US" smtClean="0"/>
+              <a:rPr lang="zh-TW" altLang="en-US"/>
               <a:t>按一下以編輯母片標題樣式</a:t>
             </a:r>
-            <a:endParaRPr lang="zh-TW" altLang="en-US"/>
           </a:p>
         </p:txBody>
       </p:sp>
@@ -1415,7 +1405,7 @@
           <a:p>
             <a:pPr lvl="0"/>
             <a:r>
-              <a:rPr lang="zh-TW" altLang="en-US" smtClean="0"/>
+              <a:rPr lang="zh-TW" altLang="en-US"/>
               <a:t>按一下以編輯母片文字樣式</a:t>
             </a:r>
           </a:p>
@@ -1443,38 +1433,37 @@
           <a:p>
             <a:pPr lvl="0"/>
             <a:r>
-              <a:rPr lang="zh-TW" altLang="en-US" smtClean="0"/>
+              <a:rPr lang="zh-TW" altLang="en-US"/>
               <a:t>按一下以編輯母片文字樣式</a:t>
             </a:r>
           </a:p>
           <a:p>
             <a:pPr lvl="1"/>
             <a:r>
-              <a:rPr lang="zh-TW" altLang="en-US" smtClean="0"/>
+              <a:rPr lang="zh-TW" altLang="en-US"/>
               <a:t>第二層</a:t>
             </a:r>
           </a:p>
           <a:p>
             <a:pPr lvl="2"/>
             <a:r>
-              <a:rPr lang="zh-TW" altLang="en-US" smtClean="0"/>
+              <a:rPr lang="zh-TW" altLang="en-US"/>
               <a:t>第三層</a:t>
             </a:r>
           </a:p>
           <a:p>
             <a:pPr lvl="3"/>
             <a:r>
-              <a:rPr lang="zh-TW" altLang="en-US" smtClean="0"/>
+              <a:rPr lang="zh-TW" altLang="en-US"/>
               <a:t>第四層</a:t>
             </a:r>
           </a:p>
           <a:p>
             <a:pPr lvl="4"/>
             <a:r>
-              <a:rPr lang="zh-TW" altLang="en-US" smtClean="0"/>
+              <a:rPr lang="zh-TW" altLang="en-US"/>
               <a:t>第五層</a:t>
             </a:r>
-            <a:endParaRPr lang="zh-TW" altLang="en-US"/>
           </a:p>
         </p:txBody>
       </p:sp>
@@ -1537,7 +1526,7 @@
           <a:p>
             <a:pPr lvl="0"/>
             <a:r>
-              <a:rPr lang="zh-TW" altLang="en-US" smtClean="0"/>
+              <a:rPr lang="zh-TW" altLang="en-US"/>
               <a:t>按一下以編輯母片文字樣式</a:t>
             </a:r>
           </a:p>
@@ -1565,38 +1554,37 @@
           <a:p>
             <a:pPr lvl="0"/>
             <a:r>
-              <a:rPr lang="zh-TW" altLang="en-US" smtClean="0"/>
+              <a:rPr lang="zh-TW" altLang="en-US"/>
               <a:t>按一下以編輯母片文字樣式</a:t>
             </a:r>
           </a:p>
           <a:p>
             <a:pPr lvl="1"/>
             <a:r>
-              <a:rPr lang="zh-TW" altLang="en-US" smtClean="0"/>
+              <a:rPr lang="zh-TW" altLang="en-US"/>
               <a:t>第二層</a:t>
             </a:r>
           </a:p>
           <a:p>
             <a:pPr lvl="2"/>
             <a:r>
-              <a:rPr lang="zh-TW" altLang="en-US" smtClean="0"/>
+              <a:rPr lang="zh-TW" altLang="en-US"/>
               <a:t>第三層</a:t>
             </a:r>
           </a:p>
           <a:p>
             <a:pPr lvl="3"/>
             <a:r>
-              <a:rPr lang="zh-TW" altLang="en-US" smtClean="0"/>
+              <a:rPr lang="zh-TW" altLang="en-US"/>
               <a:t>第四層</a:t>
             </a:r>
           </a:p>
           <a:p>
             <a:pPr lvl="4"/>
             <a:r>
-              <a:rPr lang="zh-TW" altLang="en-US" smtClean="0"/>
+              <a:rPr lang="zh-TW" altLang="en-US"/>
               <a:t>第五層</a:t>
             </a:r>
-            <a:endParaRPr lang="zh-TW" altLang="en-US"/>
           </a:p>
         </p:txBody>
       </p:sp>
@@ -1617,7 +1605,7 @@
           <a:p>
             <a:fld id="{09ED4CA7-3F8E-487E-9B05-644D00AA2FC0}" type="datetimeFigureOut">
               <a:rPr lang="zh-TW" altLang="en-US" smtClean="0"/>
-              <a:t>2017/11/23</a:t>
+              <a:t>2017/11/27</a:t>
             </a:fld>
             <a:endParaRPr lang="zh-TW" altLang="en-US"/>
           </a:p>
@@ -1711,10 +1699,9 @@
           <a:lstStyle/>
           <a:p>
             <a:r>
-              <a:rPr lang="zh-TW" altLang="en-US" smtClean="0"/>
+              <a:rPr lang="zh-TW" altLang="en-US"/>
               <a:t>按一下以編輯母片標題樣式</a:t>
             </a:r>
-            <a:endParaRPr lang="zh-TW" altLang="en-US"/>
           </a:p>
         </p:txBody>
       </p:sp>
@@ -1735,7 +1722,7 @@
           <a:p>
             <a:fld id="{09ED4CA7-3F8E-487E-9B05-644D00AA2FC0}" type="datetimeFigureOut">
               <a:rPr lang="zh-TW" altLang="en-US" smtClean="0"/>
-              <a:t>2017/11/23</a:t>
+              <a:t>2017/11/27</a:t>
             </a:fld>
             <a:endParaRPr lang="zh-TW" altLang="en-US"/>
           </a:p>
@@ -1830,7 +1817,7 @@
           <a:p>
             <a:fld id="{09ED4CA7-3F8E-487E-9B05-644D00AA2FC0}" type="datetimeFigureOut">
               <a:rPr lang="zh-TW" altLang="en-US" smtClean="0"/>
-              <a:t>2017/11/23</a:t>
+              <a:t>2017/11/27</a:t>
             </a:fld>
             <a:endParaRPr lang="zh-TW" altLang="en-US"/>
           </a:p>
@@ -1933,10 +1920,9 @@
           </a:lstStyle>
           <a:p>
             <a:r>
-              <a:rPr lang="zh-TW" altLang="en-US" smtClean="0"/>
+              <a:rPr lang="zh-TW" altLang="en-US"/>
               <a:t>按一下以編輯母片標題樣式</a:t>
             </a:r>
-            <a:endParaRPr lang="zh-TW" altLang="en-US"/>
           </a:p>
         </p:txBody>
       </p:sp>
@@ -1990,38 +1976,37 @@
           <a:p>
             <a:pPr lvl="0"/>
             <a:r>
-              <a:rPr lang="zh-TW" altLang="en-US" smtClean="0"/>
+              <a:rPr lang="zh-TW" altLang="en-US"/>
               <a:t>按一下以編輯母片文字樣式</a:t>
             </a:r>
           </a:p>
           <a:p>
             <a:pPr lvl="1"/>
             <a:r>
-              <a:rPr lang="zh-TW" altLang="en-US" smtClean="0"/>
+              <a:rPr lang="zh-TW" altLang="en-US"/>
               <a:t>第二層</a:t>
             </a:r>
           </a:p>
           <a:p>
             <a:pPr lvl="2"/>
             <a:r>
-              <a:rPr lang="zh-TW" altLang="en-US" smtClean="0"/>
+              <a:rPr lang="zh-TW" altLang="en-US"/>
               <a:t>第三層</a:t>
             </a:r>
           </a:p>
           <a:p>
             <a:pPr lvl="3"/>
             <a:r>
-              <a:rPr lang="zh-TW" altLang="en-US" smtClean="0"/>
+              <a:rPr lang="zh-TW" altLang="en-US"/>
               <a:t>第四層</a:t>
             </a:r>
           </a:p>
           <a:p>
             <a:pPr lvl="4"/>
             <a:r>
-              <a:rPr lang="zh-TW" altLang="en-US" smtClean="0"/>
+              <a:rPr lang="zh-TW" altLang="en-US"/>
               <a:t>第五層</a:t>
             </a:r>
-            <a:endParaRPr lang="zh-TW" altLang="en-US"/>
           </a:p>
         </p:txBody>
       </p:sp>
@@ -2084,7 +2069,7 @@
           <a:p>
             <a:pPr lvl="0"/>
             <a:r>
-              <a:rPr lang="zh-TW" altLang="en-US" smtClean="0"/>
+              <a:rPr lang="zh-TW" altLang="en-US"/>
               <a:t>按一下以編輯母片文字樣式</a:t>
             </a:r>
           </a:p>
@@ -2107,7 +2092,7 @@
           <a:p>
             <a:fld id="{09ED4CA7-3F8E-487E-9B05-644D00AA2FC0}" type="datetimeFigureOut">
               <a:rPr lang="zh-TW" altLang="en-US" smtClean="0"/>
-              <a:t>2017/11/23</a:t>
+              <a:t>2017/11/27</a:t>
             </a:fld>
             <a:endParaRPr lang="zh-TW" altLang="en-US"/>
           </a:p>
@@ -2210,10 +2195,9 @@
           </a:lstStyle>
           <a:p>
             <a:r>
-              <a:rPr lang="zh-TW" altLang="en-US" smtClean="0"/>
+              <a:rPr lang="zh-TW" altLang="en-US"/>
               <a:t>按一下以編輯母片標題樣式</a:t>
             </a:r>
-            <a:endParaRPr lang="zh-TW" altLang="en-US"/>
           </a:p>
         </p:txBody>
       </p:sp>
@@ -2337,7 +2321,7 @@
           <a:p>
             <a:pPr lvl="0"/>
             <a:r>
-              <a:rPr lang="zh-TW" altLang="en-US" smtClean="0"/>
+              <a:rPr lang="zh-TW" altLang="en-US"/>
               <a:t>按一下以編輯母片文字樣式</a:t>
             </a:r>
           </a:p>
@@ -2360,7 +2344,7 @@
           <a:p>
             <a:fld id="{09ED4CA7-3F8E-487E-9B05-644D00AA2FC0}" type="datetimeFigureOut">
               <a:rPr lang="zh-TW" altLang="en-US" smtClean="0"/>
-              <a:t>2017/11/23</a:t>
+              <a:t>2017/11/27</a:t>
             </a:fld>
             <a:endParaRPr lang="zh-TW" altLang="en-US"/>
           </a:p>
@@ -2469,10 +2453,9 @@
           <a:lstStyle/>
           <a:p>
             <a:r>
-              <a:rPr lang="zh-TW" altLang="en-US" smtClean="0"/>
+              <a:rPr lang="zh-TW" altLang="en-US"/>
               <a:t>按一下以編輯母片標題樣式</a:t>
             </a:r>
-            <a:endParaRPr lang="zh-TW" altLang="en-US"/>
           </a:p>
         </p:txBody>
       </p:sp>
@@ -2503,38 +2486,37 @@
           <a:p>
             <a:pPr lvl="0"/>
             <a:r>
-              <a:rPr lang="zh-TW" altLang="en-US" smtClean="0"/>
+              <a:rPr lang="zh-TW" altLang="en-US"/>
               <a:t>按一下以編輯母片文字樣式</a:t>
             </a:r>
           </a:p>
           <a:p>
             <a:pPr lvl="1"/>
             <a:r>
-              <a:rPr lang="zh-TW" altLang="en-US" smtClean="0"/>
+              <a:rPr lang="zh-TW" altLang="en-US"/>
               <a:t>第二層</a:t>
             </a:r>
           </a:p>
           <a:p>
             <a:pPr lvl="2"/>
             <a:r>
-              <a:rPr lang="zh-TW" altLang="en-US" smtClean="0"/>
+              <a:rPr lang="zh-TW" altLang="en-US"/>
               <a:t>第三層</a:t>
             </a:r>
           </a:p>
           <a:p>
             <a:pPr lvl="3"/>
             <a:r>
-              <a:rPr lang="zh-TW" altLang="en-US" smtClean="0"/>
+              <a:rPr lang="zh-TW" altLang="en-US"/>
               <a:t>第四層</a:t>
             </a:r>
           </a:p>
           <a:p>
             <a:pPr lvl="4"/>
             <a:r>
-              <a:rPr lang="zh-TW" altLang="en-US" smtClean="0"/>
+              <a:rPr lang="zh-TW" altLang="en-US"/>
               <a:t>第五層</a:t>
             </a:r>
-            <a:endParaRPr lang="zh-TW" altLang="en-US"/>
           </a:p>
         </p:txBody>
       </p:sp>
@@ -2573,7 +2555,7 @@
           <a:p>
             <a:fld id="{09ED4CA7-3F8E-487E-9B05-644D00AA2FC0}" type="datetimeFigureOut">
               <a:rPr lang="zh-TW" altLang="en-US" smtClean="0"/>
-              <a:t>2017/11/23</a:t>
+              <a:t>2017/11/27</a:t>
             </a:fld>
             <a:endParaRPr lang="zh-TW" altLang="en-US"/>
           </a:p>
@@ -3113,186 +3095,6 @@
 </p:sld>
 </file>
 
-<file path=ppt/slides/slide10.xml><?xml version="1.0" encoding="utf-8"?>
-<p:sld xmlns:a="http://schemas.openxmlformats.org/drawingml/2006/main" xmlns:r="http://schemas.openxmlformats.org/officeDocument/2006/relationships" xmlns:p="http://schemas.openxmlformats.org/presentationml/2006/main">
-  <p:cSld>
-    <p:spTree>
-      <p:nvGrpSpPr>
-        <p:cNvPr id="1" name=""/>
-        <p:cNvGrpSpPr/>
-        <p:nvPr/>
-      </p:nvGrpSpPr>
-      <p:grpSpPr>
-        <a:xfrm>
-          <a:off x="0" y="0"/>
-          <a:ext cx="0" cy="0"/>
-          <a:chOff x="0" y="0"/>
-          <a:chExt cx="0" cy="0"/>
-        </a:xfrm>
-      </p:grpSpPr>
-    </p:spTree>
-    <p:extLst>
-      <p:ext uri="{BB962C8B-B14F-4D97-AF65-F5344CB8AC3E}">
-        <p14:creationId xmlns:p14="http://schemas.microsoft.com/office/powerpoint/2010/main" val="1053160853"/>
-      </p:ext>
-    </p:extLst>
-  </p:cSld>
-  <p:clrMapOvr>
-    <a:masterClrMapping/>
-  </p:clrMapOvr>
-</p:sld>
-</file>
-
-<file path=ppt/slides/slide11.xml><?xml version="1.0" encoding="utf-8"?>
-<p:sld xmlns:a="http://schemas.openxmlformats.org/drawingml/2006/main" xmlns:r="http://schemas.openxmlformats.org/officeDocument/2006/relationships" xmlns:p="http://schemas.openxmlformats.org/presentationml/2006/main">
-  <p:cSld>
-    <p:spTree>
-      <p:nvGrpSpPr>
-        <p:cNvPr id="1" name=""/>
-        <p:cNvGrpSpPr/>
-        <p:nvPr/>
-      </p:nvGrpSpPr>
-      <p:grpSpPr>
-        <a:xfrm>
-          <a:off x="0" y="0"/>
-          <a:ext cx="0" cy="0"/>
-          <a:chOff x="0" y="0"/>
-          <a:chExt cx="0" cy="0"/>
-        </a:xfrm>
-      </p:grpSpPr>
-    </p:spTree>
-    <p:extLst>
-      <p:ext uri="{BB962C8B-B14F-4D97-AF65-F5344CB8AC3E}">
-        <p14:creationId xmlns:p14="http://schemas.microsoft.com/office/powerpoint/2010/main" val="2786702346"/>
-      </p:ext>
-    </p:extLst>
-  </p:cSld>
-  <p:clrMapOvr>
-    <a:masterClrMapping/>
-  </p:clrMapOvr>
-</p:sld>
-</file>
-
-<file path=ppt/slides/slide12.xml><?xml version="1.0" encoding="utf-8"?>
-<p:sld xmlns:a="http://schemas.openxmlformats.org/drawingml/2006/main" xmlns:r="http://schemas.openxmlformats.org/officeDocument/2006/relationships" xmlns:p="http://schemas.openxmlformats.org/presentationml/2006/main">
-  <p:cSld>
-    <p:spTree>
-      <p:nvGrpSpPr>
-        <p:cNvPr id="1" name=""/>
-        <p:cNvGrpSpPr/>
-        <p:nvPr/>
-      </p:nvGrpSpPr>
-      <p:grpSpPr>
-        <a:xfrm>
-          <a:off x="0" y="0"/>
-          <a:ext cx="0" cy="0"/>
-          <a:chOff x="0" y="0"/>
-          <a:chExt cx="0" cy="0"/>
-        </a:xfrm>
-      </p:grpSpPr>
-    </p:spTree>
-    <p:extLst>
-      <p:ext uri="{BB962C8B-B14F-4D97-AF65-F5344CB8AC3E}">
-        <p14:creationId xmlns:p14="http://schemas.microsoft.com/office/powerpoint/2010/main" val="764797054"/>
-      </p:ext>
-    </p:extLst>
-  </p:cSld>
-  <p:clrMapOvr>
-    <a:masterClrMapping/>
-  </p:clrMapOvr>
-</p:sld>
-</file>
-
-<file path=ppt/slides/slide13.xml><?xml version="1.0" encoding="utf-8"?>
-<p:sld xmlns:a="http://schemas.openxmlformats.org/drawingml/2006/main" xmlns:r="http://schemas.openxmlformats.org/officeDocument/2006/relationships" xmlns:p="http://schemas.openxmlformats.org/presentationml/2006/main">
-  <p:cSld>
-    <p:spTree>
-      <p:nvGrpSpPr>
-        <p:cNvPr id="1" name=""/>
-        <p:cNvGrpSpPr/>
-        <p:nvPr/>
-      </p:nvGrpSpPr>
-      <p:grpSpPr>
-        <a:xfrm>
-          <a:off x="0" y="0"/>
-          <a:ext cx="0" cy="0"/>
-          <a:chOff x="0" y="0"/>
-          <a:chExt cx="0" cy="0"/>
-        </a:xfrm>
-      </p:grpSpPr>
-    </p:spTree>
-    <p:extLst>
-      <p:ext uri="{BB962C8B-B14F-4D97-AF65-F5344CB8AC3E}">
-        <p14:creationId xmlns:p14="http://schemas.microsoft.com/office/powerpoint/2010/main" val="3465418231"/>
-      </p:ext>
-    </p:extLst>
-  </p:cSld>
-  <p:clrMapOvr>
-    <a:masterClrMapping/>
-  </p:clrMapOvr>
-</p:sld>
-</file>
-
-<file path=ppt/slides/slide14.xml><?xml version="1.0" encoding="utf-8"?>
-<p:sld xmlns:a="http://schemas.openxmlformats.org/drawingml/2006/main" xmlns:r="http://schemas.openxmlformats.org/officeDocument/2006/relationships" xmlns:p="http://schemas.openxmlformats.org/presentationml/2006/main">
-  <p:cSld>
-    <p:spTree>
-      <p:nvGrpSpPr>
-        <p:cNvPr id="1" name=""/>
-        <p:cNvGrpSpPr/>
-        <p:nvPr/>
-      </p:nvGrpSpPr>
-      <p:grpSpPr>
-        <a:xfrm>
-          <a:off x="0" y="0"/>
-          <a:ext cx="0" cy="0"/>
-          <a:chOff x="0" y="0"/>
-          <a:chExt cx="0" cy="0"/>
-        </a:xfrm>
-      </p:grpSpPr>
-    </p:spTree>
-    <p:extLst>
-      <p:ext uri="{BB962C8B-B14F-4D97-AF65-F5344CB8AC3E}">
-        <p14:creationId xmlns:p14="http://schemas.microsoft.com/office/powerpoint/2010/main" val="1959620175"/>
-      </p:ext>
-    </p:extLst>
-  </p:cSld>
-  <p:clrMapOvr>
-    <a:masterClrMapping/>
-  </p:clrMapOvr>
-</p:sld>
-</file>
-
-<file path=ppt/slides/slide15.xml><?xml version="1.0" encoding="utf-8"?>
-<p:sld xmlns:a="http://schemas.openxmlformats.org/drawingml/2006/main" xmlns:r="http://schemas.openxmlformats.org/officeDocument/2006/relationships" xmlns:p="http://schemas.openxmlformats.org/presentationml/2006/main">
-  <p:cSld>
-    <p:spTree>
-      <p:nvGrpSpPr>
-        <p:cNvPr id="1" name=""/>
-        <p:cNvGrpSpPr/>
-        <p:nvPr/>
-      </p:nvGrpSpPr>
-      <p:grpSpPr>
-        <a:xfrm>
-          <a:off x="0" y="0"/>
-          <a:ext cx="0" cy="0"/>
-          <a:chOff x="0" y="0"/>
-          <a:chExt cx="0" cy="0"/>
-        </a:xfrm>
-      </p:grpSpPr>
-    </p:spTree>
-    <p:extLst>
-      <p:ext uri="{BB962C8B-B14F-4D97-AF65-F5344CB8AC3E}">
-        <p14:creationId xmlns:p14="http://schemas.microsoft.com/office/powerpoint/2010/main" val="3055942187"/>
-      </p:ext>
-    </p:extLst>
-  </p:cSld>
-  <p:clrMapOvr>
-    <a:masterClrMapping/>
-  </p:clrMapOvr>
-</p:sld>
-</file>
-
 <file path=ppt/slides/slide2.xml><?xml version="1.0" encoding="utf-8"?>
 <p:sld xmlns:a="http://schemas.openxmlformats.org/drawingml/2006/main" xmlns:r="http://schemas.openxmlformats.org/officeDocument/2006/relationships" xmlns:p="http://schemas.openxmlformats.org/presentationml/2006/main">
   <p:cSld>

</xml_diff>